<commit_message>
removing temp files from achen branch
</commit_message>
<xml_diff>
--- a/presentations/4_exploratory_data_analysis/05_1_Exploratory Data Analysis.pptx
+++ b/presentations/4_exploratory_data_analysis/05_1_Exploratory Data Analysis.pptx
@@ -153,6 +153,9 @@
         </p15:guide>
       </p15:sldGuideLst>
     </p:ext>
+    <p:ext uri="{2D200454-40CA-4A62-9FC3-DE9A4176ACB9}">
+      <p15:notesGuideLst xmlns:p15="http://schemas.microsoft.com/office/powerpoint/2012/main"/>
+    </p:ext>
   </p:extLst>
 </p:presentation>
 </file>
@@ -239,7 +242,7 @@
           <a:p>
             <a:fld id="{2793983C-EFA1-41D2-8DCF-4CEF34100D6A}" type="datetimeFigureOut">
               <a:rPr lang="en-US" smtClean="0"/>
-              <a:t>8/1/2014</a:t>
+              <a:t>3/10/2017</a:t>
             </a:fld>
             <a:endParaRPr lang="en-US"/>
           </a:p>
@@ -551,44 +554,7 @@
           <a:bodyPr/>
           <a:lstStyle/>
           <a:p>
-            <a:r>
-              <a:rPr lang="en-US" dirty="0" smtClean="0"/>
-              <a:t>The descriptiv</a:t>
-            </a:r>
-            <a:r>
-              <a:rPr lang="en-US" baseline="0" dirty="0" smtClean="0"/>
-              <a:t>e statistics like mean, standard deviation, IQR, </a:t>
-            </a:r>
-            <a:r>
-              <a:rPr lang="en-US" baseline="0" dirty="0" err="1" smtClean="0"/>
-              <a:t>skewness</a:t>
-            </a:r>
-            <a:r>
-              <a:rPr lang="en-US" baseline="0" dirty="0" smtClean="0"/>
-              <a:t>, and kurtosis describe the distribution of the data. A normal distribution has a mean of 0, standard deviation of 1, </a:t>
-            </a:r>
-            <a:r>
-              <a:rPr lang="en-US" baseline="0" dirty="0" err="1" smtClean="0"/>
-              <a:t>skewness</a:t>
-            </a:r>
-            <a:r>
-              <a:rPr lang="en-US" baseline="0" dirty="0" smtClean="0"/>
-              <a:t> of 0, and kurtosis of 0. </a:t>
-            </a:r>
-          </a:p>
-          <a:p>
-            <a:endParaRPr lang="en-US" baseline="0" dirty="0" smtClean="0"/>
-          </a:p>
-          <a:p>
-            <a:r>
-              <a:rPr lang="en-US" dirty="0" smtClean="0"/>
-              <a:t>You can correct for normality</a:t>
-            </a:r>
-            <a:r>
-              <a:rPr lang="en-US" baseline="0" dirty="0" smtClean="0"/>
-              <a:t> in multiple ways: delete outliers, log-transform, square root transform, </a:t>
-            </a:r>
-            <a:endParaRPr lang="en-US" dirty="0"/>
+            <a:endParaRPr lang="en-US"/>
           </a:p>
         </p:txBody>
       </p:sp>
@@ -609,7 +575,7 @@
           <a:p>
             <a:fld id="{CC5A1FCD-79C7-4337-B79E-A51417706FB1}" type="slidenum">
               <a:rPr lang="en-US" smtClean="0"/>
-              <a:t>6</a:t>
+              <a:t>1</a:t>
             </a:fld>
             <a:endParaRPr lang="en-US"/>
           </a:p>
@@ -618,7 +584,1045 @@
     </p:spTree>
     <p:extLst>
       <p:ext uri="{BB962C8B-B14F-4D97-AF65-F5344CB8AC3E}">
-        <p14:creationId xmlns:p14="http://schemas.microsoft.com/office/powerpoint/2010/main" val="792934042"/>
+        <p14:creationId xmlns:p14="http://schemas.microsoft.com/office/powerpoint/2010/main" val="2785032582"/>
+      </p:ext>
+    </p:extLst>
+  </p:cSld>
+  <p:clrMapOvr>
+    <a:masterClrMapping/>
+  </p:clrMapOvr>
+</p:notes>
+</file>
+
+<file path=ppt/notesSlides/notesSlide10.xml><?xml version="1.0" encoding="utf-8"?>
+<p:notes xmlns:a="http://schemas.openxmlformats.org/drawingml/2006/main" xmlns:r="http://schemas.openxmlformats.org/officeDocument/2006/relationships" xmlns:p="http://schemas.openxmlformats.org/presentationml/2006/main">
+  <p:cSld>
+    <p:spTree>
+      <p:nvGrpSpPr>
+        <p:cNvPr id="1" name=""/>
+        <p:cNvGrpSpPr/>
+        <p:nvPr/>
+      </p:nvGrpSpPr>
+      <p:grpSpPr>
+        <a:xfrm>
+          <a:off x="0" y="0"/>
+          <a:ext cx="0" cy="0"/>
+          <a:chOff x="0" y="0"/>
+          <a:chExt cx="0" cy="0"/>
+        </a:xfrm>
+      </p:grpSpPr>
+      <p:sp>
+        <p:nvSpPr>
+          <p:cNvPr id="2" name="Slide Image Placeholder 1"/>
+          <p:cNvSpPr>
+            <a:spLocks noGrp="1" noRot="1" noChangeAspect="1"/>
+          </p:cNvSpPr>
+          <p:nvPr>
+            <p:ph type="sldImg"/>
+          </p:nvPr>
+        </p:nvSpPr>
+        <p:spPr/>
+      </p:sp>
+      <p:sp>
+        <p:nvSpPr>
+          <p:cNvPr id="3" name="Notes Placeholder 2"/>
+          <p:cNvSpPr>
+            <a:spLocks noGrp="1"/>
+          </p:cNvSpPr>
+          <p:nvPr>
+            <p:ph type="body" idx="1"/>
+          </p:nvPr>
+        </p:nvSpPr>
+        <p:spPr/>
+        <p:txBody>
+          <a:bodyPr/>
+          <a:lstStyle/>
+          <a:p>
+            <a:endParaRPr lang="en-US"/>
+          </a:p>
+        </p:txBody>
+      </p:sp>
+      <p:sp>
+        <p:nvSpPr>
+          <p:cNvPr id="4" name="Slide Number Placeholder 3"/>
+          <p:cNvSpPr>
+            <a:spLocks noGrp="1"/>
+          </p:cNvSpPr>
+          <p:nvPr>
+            <p:ph type="sldNum" sz="quarter" idx="10"/>
+          </p:nvPr>
+        </p:nvSpPr>
+        <p:spPr/>
+        <p:txBody>
+          <a:bodyPr/>
+          <a:lstStyle/>
+          <a:p>
+            <a:fld id="{CC5A1FCD-79C7-4337-B79E-A51417706FB1}" type="slidenum">
+              <a:rPr lang="en-US" smtClean="0"/>
+              <a:t>10</a:t>
+            </a:fld>
+            <a:endParaRPr lang="en-US"/>
+          </a:p>
+        </p:txBody>
+      </p:sp>
+    </p:spTree>
+    <p:extLst>
+      <p:ext uri="{BB962C8B-B14F-4D97-AF65-F5344CB8AC3E}">
+        <p14:creationId xmlns:p14="http://schemas.microsoft.com/office/powerpoint/2010/main" val="2963943899"/>
+      </p:ext>
+    </p:extLst>
+  </p:cSld>
+  <p:clrMapOvr>
+    <a:masterClrMapping/>
+  </p:clrMapOvr>
+</p:notes>
+</file>
+
+<file path=ppt/notesSlides/notesSlide11.xml><?xml version="1.0" encoding="utf-8"?>
+<p:notes xmlns:a="http://schemas.openxmlformats.org/drawingml/2006/main" xmlns:r="http://schemas.openxmlformats.org/officeDocument/2006/relationships" xmlns:p="http://schemas.openxmlformats.org/presentationml/2006/main">
+  <p:cSld>
+    <p:spTree>
+      <p:nvGrpSpPr>
+        <p:cNvPr id="1" name=""/>
+        <p:cNvGrpSpPr/>
+        <p:nvPr/>
+      </p:nvGrpSpPr>
+      <p:grpSpPr>
+        <a:xfrm>
+          <a:off x="0" y="0"/>
+          <a:ext cx="0" cy="0"/>
+          <a:chOff x="0" y="0"/>
+          <a:chExt cx="0" cy="0"/>
+        </a:xfrm>
+      </p:grpSpPr>
+      <p:sp>
+        <p:nvSpPr>
+          <p:cNvPr id="2" name="Slide Image Placeholder 1"/>
+          <p:cNvSpPr>
+            <a:spLocks noGrp="1" noRot="1" noChangeAspect="1"/>
+          </p:cNvSpPr>
+          <p:nvPr>
+            <p:ph type="sldImg"/>
+          </p:nvPr>
+        </p:nvSpPr>
+        <p:spPr/>
+      </p:sp>
+      <p:sp>
+        <p:nvSpPr>
+          <p:cNvPr id="3" name="Notes Placeholder 2"/>
+          <p:cNvSpPr>
+            <a:spLocks noGrp="1"/>
+          </p:cNvSpPr>
+          <p:nvPr>
+            <p:ph type="body" idx="1"/>
+          </p:nvPr>
+        </p:nvSpPr>
+        <p:spPr/>
+        <p:txBody>
+          <a:bodyPr/>
+          <a:lstStyle/>
+          <a:p>
+            <a:endParaRPr lang="en-US"/>
+          </a:p>
+        </p:txBody>
+      </p:sp>
+      <p:sp>
+        <p:nvSpPr>
+          <p:cNvPr id="4" name="Slide Number Placeholder 3"/>
+          <p:cNvSpPr>
+            <a:spLocks noGrp="1"/>
+          </p:cNvSpPr>
+          <p:nvPr>
+            <p:ph type="sldNum" sz="quarter" idx="10"/>
+          </p:nvPr>
+        </p:nvSpPr>
+        <p:spPr/>
+        <p:txBody>
+          <a:bodyPr/>
+          <a:lstStyle/>
+          <a:p>
+            <a:fld id="{CC5A1FCD-79C7-4337-B79E-A51417706FB1}" type="slidenum">
+              <a:rPr lang="en-US" smtClean="0"/>
+              <a:t>11</a:t>
+            </a:fld>
+            <a:endParaRPr lang="en-US"/>
+          </a:p>
+        </p:txBody>
+      </p:sp>
+    </p:spTree>
+    <p:extLst>
+      <p:ext uri="{BB962C8B-B14F-4D97-AF65-F5344CB8AC3E}">
+        <p14:creationId xmlns:p14="http://schemas.microsoft.com/office/powerpoint/2010/main" val="1590032013"/>
+      </p:ext>
+    </p:extLst>
+  </p:cSld>
+  <p:clrMapOvr>
+    <a:masterClrMapping/>
+  </p:clrMapOvr>
+</p:notes>
+</file>
+
+<file path=ppt/notesSlides/notesSlide12.xml><?xml version="1.0" encoding="utf-8"?>
+<p:notes xmlns:a="http://schemas.openxmlformats.org/drawingml/2006/main" xmlns:r="http://schemas.openxmlformats.org/officeDocument/2006/relationships" xmlns:p="http://schemas.openxmlformats.org/presentationml/2006/main">
+  <p:cSld>
+    <p:spTree>
+      <p:nvGrpSpPr>
+        <p:cNvPr id="1" name=""/>
+        <p:cNvGrpSpPr/>
+        <p:nvPr/>
+      </p:nvGrpSpPr>
+      <p:grpSpPr>
+        <a:xfrm>
+          <a:off x="0" y="0"/>
+          <a:ext cx="0" cy="0"/>
+          <a:chOff x="0" y="0"/>
+          <a:chExt cx="0" cy="0"/>
+        </a:xfrm>
+      </p:grpSpPr>
+      <p:sp>
+        <p:nvSpPr>
+          <p:cNvPr id="2" name="Slide Image Placeholder 1"/>
+          <p:cNvSpPr>
+            <a:spLocks noGrp="1" noRot="1" noChangeAspect="1"/>
+          </p:cNvSpPr>
+          <p:nvPr>
+            <p:ph type="sldImg"/>
+          </p:nvPr>
+        </p:nvSpPr>
+        <p:spPr/>
+      </p:sp>
+      <p:sp>
+        <p:nvSpPr>
+          <p:cNvPr id="3" name="Notes Placeholder 2"/>
+          <p:cNvSpPr>
+            <a:spLocks noGrp="1"/>
+          </p:cNvSpPr>
+          <p:nvPr>
+            <p:ph type="body" idx="1"/>
+          </p:nvPr>
+        </p:nvSpPr>
+        <p:spPr/>
+        <p:txBody>
+          <a:bodyPr/>
+          <a:lstStyle/>
+          <a:p>
+            <a:endParaRPr lang="en-US"/>
+          </a:p>
+        </p:txBody>
+      </p:sp>
+      <p:sp>
+        <p:nvSpPr>
+          <p:cNvPr id="4" name="Slide Number Placeholder 3"/>
+          <p:cNvSpPr>
+            <a:spLocks noGrp="1"/>
+          </p:cNvSpPr>
+          <p:nvPr>
+            <p:ph type="sldNum" sz="quarter" idx="10"/>
+          </p:nvPr>
+        </p:nvSpPr>
+        <p:spPr/>
+        <p:txBody>
+          <a:bodyPr/>
+          <a:lstStyle/>
+          <a:p>
+            <a:fld id="{CC5A1FCD-79C7-4337-B79E-A51417706FB1}" type="slidenum">
+              <a:rPr lang="en-US" smtClean="0"/>
+              <a:t>12</a:t>
+            </a:fld>
+            <a:endParaRPr lang="en-US"/>
+          </a:p>
+        </p:txBody>
+      </p:sp>
+    </p:spTree>
+    <p:extLst>
+      <p:ext uri="{BB962C8B-B14F-4D97-AF65-F5344CB8AC3E}">
+        <p14:creationId xmlns:p14="http://schemas.microsoft.com/office/powerpoint/2010/main" val="2677018819"/>
+      </p:ext>
+    </p:extLst>
+  </p:cSld>
+  <p:clrMapOvr>
+    <a:masterClrMapping/>
+  </p:clrMapOvr>
+</p:notes>
+</file>
+
+<file path=ppt/notesSlides/notesSlide13.xml><?xml version="1.0" encoding="utf-8"?>
+<p:notes xmlns:a="http://schemas.openxmlformats.org/drawingml/2006/main" xmlns:r="http://schemas.openxmlformats.org/officeDocument/2006/relationships" xmlns:p="http://schemas.openxmlformats.org/presentationml/2006/main">
+  <p:cSld>
+    <p:spTree>
+      <p:nvGrpSpPr>
+        <p:cNvPr id="1" name=""/>
+        <p:cNvGrpSpPr/>
+        <p:nvPr/>
+      </p:nvGrpSpPr>
+      <p:grpSpPr>
+        <a:xfrm>
+          <a:off x="0" y="0"/>
+          <a:ext cx="0" cy="0"/>
+          <a:chOff x="0" y="0"/>
+          <a:chExt cx="0" cy="0"/>
+        </a:xfrm>
+      </p:grpSpPr>
+      <p:sp>
+        <p:nvSpPr>
+          <p:cNvPr id="2" name="Slide Image Placeholder 1"/>
+          <p:cNvSpPr>
+            <a:spLocks noGrp="1" noRot="1" noChangeAspect="1"/>
+          </p:cNvSpPr>
+          <p:nvPr>
+            <p:ph type="sldImg"/>
+          </p:nvPr>
+        </p:nvSpPr>
+        <p:spPr/>
+      </p:sp>
+      <p:sp>
+        <p:nvSpPr>
+          <p:cNvPr id="3" name="Notes Placeholder 2"/>
+          <p:cNvSpPr>
+            <a:spLocks noGrp="1"/>
+          </p:cNvSpPr>
+          <p:nvPr>
+            <p:ph type="body" idx="1"/>
+          </p:nvPr>
+        </p:nvSpPr>
+        <p:spPr/>
+        <p:txBody>
+          <a:bodyPr/>
+          <a:lstStyle/>
+          <a:p>
+            <a:r>
+              <a:rPr lang="en-US" dirty="0" smtClean="0"/>
+              <a:t>QQ plot is a standardization of your data where 0 is the mean, 1 and 2 are 1 and 2 standard deviations.</a:t>
+            </a:r>
+          </a:p>
+          <a:p>
+            <a:endParaRPr lang="en-US" dirty="0"/>
+          </a:p>
+          <a:p>
+            <a:r>
+              <a:rPr lang="en-US" dirty="0"/>
+              <a:t>The standard score of a raw score </a:t>
+            </a:r>
+            <a:r>
+              <a:rPr lang="en-US" i="1" dirty="0"/>
+              <a:t>x</a:t>
+            </a:r>
+            <a:r>
+              <a:rPr lang="en-US" dirty="0"/>
+              <a:t> </a:t>
+            </a:r>
+            <a:r>
+              <a:rPr lang="en-US" baseline="30000" dirty="0">
+                <a:hlinkClick r:id="rId3"/>
+              </a:rPr>
+              <a:t>[1]</a:t>
+            </a:r>
+            <a:r>
+              <a:rPr lang="en-US" dirty="0"/>
+              <a:t> </a:t>
+            </a:r>
+            <a:r>
+              <a:rPr lang="en-US" dirty="0" smtClean="0"/>
+              <a:t>is</a:t>
+            </a:r>
+          </a:p>
+          <a:p>
+            <a:r>
+              <a:rPr lang="en-US" dirty="0" smtClean="0"/>
+              <a:t>Z = </a:t>
+            </a:r>
+            <a:r>
+              <a:rPr lang="en-US" smtClean="0"/>
+              <a:t>x-</a:t>
+            </a:r>
+            <a:r>
+              <a:rPr lang="en-US" i="1"/>
+              <a:t> </a:t>
+            </a:r>
+            <a:r>
+              <a:rPr lang="en-US" i="1" smtClean="0"/>
+              <a:t>μ/</a:t>
+            </a:r>
+            <a:r>
+              <a:rPr lang="en-US" i="1"/>
+              <a:t>σ</a:t>
+            </a:r>
+            <a:endParaRPr lang="en-US" dirty="0"/>
+          </a:p>
+          <a:p>
+            <a:r>
+              <a:rPr lang="en-US" dirty="0"/>
+              <a:t>where:</a:t>
+            </a:r>
+          </a:p>
+          <a:p>
+            <a:r>
+              <a:rPr lang="en-US" i="1" dirty="0"/>
+              <a:t>μ</a:t>
+            </a:r>
+            <a:r>
+              <a:rPr lang="en-US" dirty="0"/>
+              <a:t> is the </a:t>
+            </a:r>
+            <a:r>
+              <a:rPr lang="en-US" dirty="0">
+                <a:hlinkClick r:id="rId4" tooltip="Mean"/>
+              </a:rPr>
+              <a:t>mean</a:t>
+            </a:r>
+            <a:r>
+              <a:rPr lang="en-US" dirty="0"/>
+              <a:t> of the </a:t>
+            </a:r>
+            <a:r>
+              <a:rPr lang="en-US" dirty="0" err="1"/>
+              <a:t>population;</a:t>
+            </a:r>
+            <a:r>
+              <a:rPr lang="en-US" i="1" dirty="0" err="1"/>
+              <a:t>σ</a:t>
+            </a:r>
+            <a:r>
+              <a:rPr lang="en-US" dirty="0"/>
+              <a:t> is the </a:t>
+            </a:r>
+            <a:r>
+              <a:rPr lang="en-US" dirty="0">
+                <a:hlinkClick r:id="rId5" tooltip="Standard deviation"/>
+              </a:rPr>
+              <a:t>standard deviation</a:t>
+            </a:r>
+            <a:r>
+              <a:rPr lang="en-US" dirty="0"/>
+              <a:t> of the population.</a:t>
+            </a:r>
+          </a:p>
+          <a:p>
+            <a:endParaRPr lang="en-US" dirty="0" smtClean="0"/>
+          </a:p>
+          <a:p>
+            <a:r>
+              <a:rPr lang="en-US" dirty="0" smtClean="0"/>
+              <a:t>If data is normal, there will be a 1:1 relationship between sample data and the data from a normal curve. Sample data will be points, normal is the solid line.</a:t>
+            </a:r>
+          </a:p>
+          <a:p>
+            <a:endParaRPr lang="en-US" dirty="0"/>
+          </a:p>
+          <a:p>
+            <a:r>
+              <a:rPr lang="en-US" dirty="0" smtClean="0"/>
+              <a:t>If there is deviation, it is usually on the low or high end, which may be ok and close enough to normal to consider as such.</a:t>
+            </a:r>
+          </a:p>
+          <a:p>
+            <a:endParaRPr lang="en-US" dirty="0"/>
+          </a:p>
+          <a:p>
+            <a:r>
+              <a:rPr lang="en-US" dirty="0" smtClean="0"/>
+              <a:t>If there is deviation from the normal line around 0, data is definitely not normal.</a:t>
+            </a:r>
+            <a:endParaRPr lang="en-US" dirty="0"/>
+          </a:p>
+        </p:txBody>
+      </p:sp>
+      <p:sp>
+        <p:nvSpPr>
+          <p:cNvPr id="4" name="Slide Number Placeholder 3"/>
+          <p:cNvSpPr>
+            <a:spLocks noGrp="1"/>
+          </p:cNvSpPr>
+          <p:nvPr>
+            <p:ph type="sldNum" sz="quarter" idx="10"/>
+          </p:nvPr>
+        </p:nvSpPr>
+        <p:spPr/>
+        <p:txBody>
+          <a:bodyPr/>
+          <a:lstStyle/>
+          <a:p>
+            <a:fld id="{CC5A1FCD-79C7-4337-B79E-A51417706FB1}" type="slidenum">
+              <a:rPr lang="en-US" smtClean="0"/>
+              <a:t>13</a:t>
+            </a:fld>
+            <a:endParaRPr lang="en-US"/>
+          </a:p>
+        </p:txBody>
+      </p:sp>
+    </p:spTree>
+    <p:extLst>
+      <p:ext uri="{BB962C8B-B14F-4D97-AF65-F5344CB8AC3E}">
+        <p14:creationId xmlns:p14="http://schemas.microsoft.com/office/powerpoint/2010/main" val="725128415"/>
+      </p:ext>
+    </p:extLst>
+  </p:cSld>
+  <p:clrMapOvr>
+    <a:masterClrMapping/>
+  </p:clrMapOvr>
+</p:notes>
+</file>
+
+<file path=ppt/notesSlides/notesSlide14.xml><?xml version="1.0" encoding="utf-8"?>
+<p:notes xmlns:a="http://schemas.openxmlformats.org/drawingml/2006/main" xmlns:r="http://schemas.openxmlformats.org/officeDocument/2006/relationships" xmlns:p="http://schemas.openxmlformats.org/presentationml/2006/main">
+  <p:cSld>
+    <p:spTree>
+      <p:nvGrpSpPr>
+        <p:cNvPr id="1" name=""/>
+        <p:cNvGrpSpPr/>
+        <p:nvPr/>
+      </p:nvGrpSpPr>
+      <p:grpSpPr>
+        <a:xfrm>
+          <a:off x="0" y="0"/>
+          <a:ext cx="0" cy="0"/>
+          <a:chOff x="0" y="0"/>
+          <a:chExt cx="0" cy="0"/>
+        </a:xfrm>
+      </p:grpSpPr>
+      <p:sp>
+        <p:nvSpPr>
+          <p:cNvPr id="2" name="Slide Image Placeholder 1"/>
+          <p:cNvSpPr>
+            <a:spLocks noGrp="1" noRot="1" noChangeAspect="1"/>
+          </p:cNvSpPr>
+          <p:nvPr>
+            <p:ph type="sldImg"/>
+          </p:nvPr>
+        </p:nvSpPr>
+        <p:spPr/>
+      </p:sp>
+      <p:sp>
+        <p:nvSpPr>
+          <p:cNvPr id="3" name="Notes Placeholder 2"/>
+          <p:cNvSpPr>
+            <a:spLocks noGrp="1"/>
+          </p:cNvSpPr>
+          <p:nvPr>
+            <p:ph type="body" idx="1"/>
+          </p:nvPr>
+        </p:nvSpPr>
+        <p:spPr/>
+        <p:txBody>
+          <a:bodyPr/>
+          <a:lstStyle/>
+          <a:p>
+            <a:endParaRPr lang="en-US"/>
+          </a:p>
+        </p:txBody>
+      </p:sp>
+      <p:sp>
+        <p:nvSpPr>
+          <p:cNvPr id="4" name="Slide Number Placeholder 3"/>
+          <p:cNvSpPr>
+            <a:spLocks noGrp="1"/>
+          </p:cNvSpPr>
+          <p:nvPr>
+            <p:ph type="sldNum" sz="quarter" idx="10"/>
+          </p:nvPr>
+        </p:nvSpPr>
+        <p:spPr/>
+        <p:txBody>
+          <a:bodyPr/>
+          <a:lstStyle/>
+          <a:p>
+            <a:fld id="{CC5A1FCD-79C7-4337-B79E-A51417706FB1}" type="slidenum">
+              <a:rPr lang="en-US" smtClean="0"/>
+              <a:t>14</a:t>
+            </a:fld>
+            <a:endParaRPr lang="en-US"/>
+          </a:p>
+        </p:txBody>
+      </p:sp>
+    </p:spTree>
+    <p:extLst>
+      <p:ext uri="{BB962C8B-B14F-4D97-AF65-F5344CB8AC3E}">
+        <p14:creationId xmlns:p14="http://schemas.microsoft.com/office/powerpoint/2010/main" val="1336984344"/>
+      </p:ext>
+    </p:extLst>
+  </p:cSld>
+  <p:clrMapOvr>
+    <a:masterClrMapping/>
+  </p:clrMapOvr>
+</p:notes>
+</file>
+
+<file path=ppt/notesSlides/notesSlide15.xml><?xml version="1.0" encoding="utf-8"?>
+<p:notes xmlns:a="http://schemas.openxmlformats.org/drawingml/2006/main" xmlns:r="http://schemas.openxmlformats.org/officeDocument/2006/relationships" xmlns:p="http://schemas.openxmlformats.org/presentationml/2006/main">
+  <p:cSld>
+    <p:spTree>
+      <p:nvGrpSpPr>
+        <p:cNvPr id="1" name=""/>
+        <p:cNvGrpSpPr/>
+        <p:nvPr/>
+      </p:nvGrpSpPr>
+      <p:grpSpPr>
+        <a:xfrm>
+          <a:off x="0" y="0"/>
+          <a:ext cx="0" cy="0"/>
+          <a:chOff x="0" y="0"/>
+          <a:chExt cx="0" cy="0"/>
+        </a:xfrm>
+      </p:grpSpPr>
+      <p:sp>
+        <p:nvSpPr>
+          <p:cNvPr id="2" name="Slide Image Placeholder 1"/>
+          <p:cNvSpPr>
+            <a:spLocks noGrp="1" noRot="1" noChangeAspect="1"/>
+          </p:cNvSpPr>
+          <p:nvPr>
+            <p:ph type="sldImg"/>
+          </p:nvPr>
+        </p:nvSpPr>
+        <p:spPr/>
+      </p:sp>
+      <p:sp>
+        <p:nvSpPr>
+          <p:cNvPr id="3" name="Notes Placeholder 2"/>
+          <p:cNvSpPr>
+            <a:spLocks noGrp="1"/>
+          </p:cNvSpPr>
+          <p:nvPr>
+            <p:ph type="body" idx="1"/>
+          </p:nvPr>
+        </p:nvSpPr>
+        <p:spPr/>
+        <p:txBody>
+          <a:bodyPr/>
+          <a:lstStyle/>
+          <a:p>
+            <a:r>
+              <a:rPr lang="en-US" dirty="0" smtClean="0"/>
+              <a:t>Multicolinearity: highly correlated</a:t>
+            </a:r>
+            <a:r>
+              <a:rPr lang="en-US" baseline="0" dirty="0" smtClean="0"/>
+              <a:t> variables that can contribute to over-fitting a model, lowering its predictive ability and inflating it’s validation statistics</a:t>
+            </a:r>
+            <a:endParaRPr lang="en-US" dirty="0"/>
+          </a:p>
+        </p:txBody>
+      </p:sp>
+      <p:sp>
+        <p:nvSpPr>
+          <p:cNvPr id="4" name="Slide Number Placeholder 3"/>
+          <p:cNvSpPr>
+            <a:spLocks noGrp="1"/>
+          </p:cNvSpPr>
+          <p:nvPr>
+            <p:ph type="sldNum" sz="quarter" idx="10"/>
+          </p:nvPr>
+        </p:nvSpPr>
+        <p:spPr/>
+        <p:txBody>
+          <a:bodyPr/>
+          <a:lstStyle/>
+          <a:p>
+            <a:fld id="{CC5A1FCD-79C7-4337-B79E-A51417706FB1}" type="slidenum">
+              <a:rPr lang="en-US" smtClean="0"/>
+              <a:t>15</a:t>
+            </a:fld>
+            <a:endParaRPr lang="en-US"/>
+          </a:p>
+        </p:txBody>
+      </p:sp>
+    </p:spTree>
+    <p:extLst>
+      <p:ext uri="{BB962C8B-B14F-4D97-AF65-F5344CB8AC3E}">
+        <p14:creationId xmlns:p14="http://schemas.microsoft.com/office/powerpoint/2010/main" val="2625421777"/>
+      </p:ext>
+    </p:extLst>
+  </p:cSld>
+  <p:clrMapOvr>
+    <a:masterClrMapping/>
+  </p:clrMapOvr>
+</p:notes>
+</file>
+
+<file path=ppt/notesSlides/notesSlide16.xml><?xml version="1.0" encoding="utf-8"?>
+<p:notes xmlns:a="http://schemas.openxmlformats.org/drawingml/2006/main" xmlns:r="http://schemas.openxmlformats.org/officeDocument/2006/relationships" xmlns:p="http://schemas.openxmlformats.org/presentationml/2006/main">
+  <p:cSld>
+    <p:spTree>
+      <p:nvGrpSpPr>
+        <p:cNvPr id="1" name=""/>
+        <p:cNvGrpSpPr/>
+        <p:nvPr/>
+      </p:nvGrpSpPr>
+      <p:grpSpPr>
+        <a:xfrm>
+          <a:off x="0" y="0"/>
+          <a:ext cx="0" cy="0"/>
+          <a:chOff x="0" y="0"/>
+          <a:chExt cx="0" cy="0"/>
+        </a:xfrm>
+      </p:grpSpPr>
+      <p:sp>
+        <p:nvSpPr>
+          <p:cNvPr id="2" name="Slide Image Placeholder 1"/>
+          <p:cNvSpPr>
+            <a:spLocks noGrp="1" noRot="1" noChangeAspect="1"/>
+          </p:cNvSpPr>
+          <p:nvPr>
+            <p:ph type="sldImg"/>
+          </p:nvPr>
+        </p:nvSpPr>
+        <p:spPr/>
+      </p:sp>
+      <p:sp>
+        <p:nvSpPr>
+          <p:cNvPr id="3" name="Notes Placeholder 2"/>
+          <p:cNvSpPr>
+            <a:spLocks noGrp="1"/>
+          </p:cNvSpPr>
+          <p:nvPr>
+            <p:ph type="body" idx="1"/>
+          </p:nvPr>
+        </p:nvSpPr>
+        <p:spPr/>
+        <p:txBody>
+          <a:bodyPr/>
+          <a:lstStyle/>
+          <a:p>
+            <a:pPr lvl="1"/>
+            <a:r>
+              <a:rPr lang="en-US" dirty="0" smtClean="0"/>
+              <a:t>Spearman’s Rho: non-parametric technique that quantifies the degree of linear association between the ranks of data</a:t>
+            </a:r>
+          </a:p>
+          <a:p>
+            <a:pPr lvl="1"/>
+            <a:r>
+              <a:rPr lang="en-US" dirty="0" smtClean="0"/>
+              <a:t>Pearson’s Coefficient: parametric technique that measures the degree of linear relationship between data</a:t>
+            </a:r>
+          </a:p>
+          <a:p>
+            <a:pPr lvl="1"/>
+            <a:r>
+              <a:rPr lang="en-US" dirty="0" smtClean="0"/>
+              <a:t>Kendall’s Tau: non-parametric measure of association based on the number of concordances and discordances in paired observations</a:t>
+            </a:r>
+          </a:p>
+          <a:p>
+            <a:endParaRPr lang="en-US" dirty="0"/>
+          </a:p>
+        </p:txBody>
+      </p:sp>
+      <p:sp>
+        <p:nvSpPr>
+          <p:cNvPr id="4" name="Slide Number Placeholder 3"/>
+          <p:cNvSpPr>
+            <a:spLocks noGrp="1"/>
+          </p:cNvSpPr>
+          <p:nvPr>
+            <p:ph type="sldNum" sz="quarter" idx="10"/>
+          </p:nvPr>
+        </p:nvSpPr>
+        <p:spPr/>
+        <p:txBody>
+          <a:bodyPr/>
+          <a:lstStyle/>
+          <a:p>
+            <a:fld id="{CC5A1FCD-79C7-4337-B79E-A51417706FB1}" type="slidenum">
+              <a:rPr lang="en-US" smtClean="0"/>
+              <a:t>16</a:t>
+            </a:fld>
+            <a:endParaRPr lang="en-US"/>
+          </a:p>
+        </p:txBody>
+      </p:sp>
+    </p:spTree>
+    <p:extLst>
+      <p:ext uri="{BB962C8B-B14F-4D97-AF65-F5344CB8AC3E}">
+        <p14:creationId xmlns:p14="http://schemas.microsoft.com/office/powerpoint/2010/main" val="3757913979"/>
+      </p:ext>
+    </p:extLst>
+  </p:cSld>
+  <p:clrMapOvr>
+    <a:masterClrMapping/>
+  </p:clrMapOvr>
+</p:notes>
+</file>
+
+<file path=ppt/notesSlides/notesSlide17.xml><?xml version="1.0" encoding="utf-8"?>
+<p:notes xmlns:a="http://schemas.openxmlformats.org/drawingml/2006/main" xmlns:r="http://schemas.openxmlformats.org/officeDocument/2006/relationships" xmlns:p="http://schemas.openxmlformats.org/presentationml/2006/main">
+  <p:cSld>
+    <p:spTree>
+      <p:nvGrpSpPr>
+        <p:cNvPr id="1" name=""/>
+        <p:cNvGrpSpPr/>
+        <p:nvPr/>
+      </p:nvGrpSpPr>
+      <p:grpSpPr>
+        <a:xfrm>
+          <a:off x="0" y="0"/>
+          <a:ext cx="0" cy="0"/>
+          <a:chOff x="0" y="0"/>
+          <a:chExt cx="0" cy="0"/>
+        </a:xfrm>
+      </p:grpSpPr>
+      <p:sp>
+        <p:nvSpPr>
+          <p:cNvPr id="2" name="Slide Image Placeholder 1"/>
+          <p:cNvSpPr>
+            <a:spLocks noGrp="1" noRot="1" noChangeAspect="1"/>
+          </p:cNvSpPr>
+          <p:nvPr>
+            <p:ph type="sldImg"/>
+          </p:nvPr>
+        </p:nvSpPr>
+        <p:spPr/>
+      </p:sp>
+      <p:sp>
+        <p:nvSpPr>
+          <p:cNvPr id="3" name="Notes Placeholder 2"/>
+          <p:cNvSpPr>
+            <a:spLocks noGrp="1"/>
+          </p:cNvSpPr>
+          <p:nvPr>
+            <p:ph type="body" idx="1"/>
+          </p:nvPr>
+        </p:nvSpPr>
+        <p:spPr/>
+        <p:txBody>
+          <a:bodyPr/>
+          <a:lstStyle/>
+          <a:p>
+            <a:r>
+              <a:rPr lang="en-US" dirty="0" smtClean="0"/>
+              <a:t>Covariance matrix calculated in R</a:t>
+            </a:r>
+            <a:endParaRPr lang="en-US" dirty="0"/>
+          </a:p>
+        </p:txBody>
+      </p:sp>
+      <p:sp>
+        <p:nvSpPr>
+          <p:cNvPr id="4" name="Slide Number Placeholder 3"/>
+          <p:cNvSpPr>
+            <a:spLocks noGrp="1"/>
+          </p:cNvSpPr>
+          <p:nvPr>
+            <p:ph type="sldNum" sz="quarter" idx="10"/>
+          </p:nvPr>
+        </p:nvSpPr>
+        <p:spPr/>
+        <p:txBody>
+          <a:bodyPr/>
+          <a:lstStyle/>
+          <a:p>
+            <a:fld id="{CC5A1FCD-79C7-4337-B79E-A51417706FB1}" type="slidenum">
+              <a:rPr lang="en-US" smtClean="0"/>
+              <a:t>17</a:t>
+            </a:fld>
+            <a:endParaRPr lang="en-US"/>
+          </a:p>
+        </p:txBody>
+      </p:sp>
+    </p:spTree>
+    <p:extLst>
+      <p:ext uri="{BB962C8B-B14F-4D97-AF65-F5344CB8AC3E}">
+        <p14:creationId xmlns:p14="http://schemas.microsoft.com/office/powerpoint/2010/main" val="3810249284"/>
+      </p:ext>
+    </p:extLst>
+  </p:cSld>
+  <p:clrMapOvr>
+    <a:masterClrMapping/>
+  </p:clrMapOvr>
+</p:notes>
+</file>
+
+<file path=ppt/notesSlides/notesSlide18.xml><?xml version="1.0" encoding="utf-8"?>
+<p:notes xmlns:a="http://schemas.openxmlformats.org/drawingml/2006/main" xmlns:r="http://schemas.openxmlformats.org/officeDocument/2006/relationships" xmlns:p="http://schemas.openxmlformats.org/presentationml/2006/main">
+  <p:cSld>
+    <p:spTree>
+      <p:nvGrpSpPr>
+        <p:cNvPr id="1" name=""/>
+        <p:cNvGrpSpPr/>
+        <p:nvPr/>
+      </p:nvGrpSpPr>
+      <p:grpSpPr>
+        <a:xfrm>
+          <a:off x="0" y="0"/>
+          <a:ext cx="0" cy="0"/>
+          <a:chOff x="0" y="0"/>
+          <a:chExt cx="0" cy="0"/>
+        </a:xfrm>
+      </p:grpSpPr>
+      <p:sp>
+        <p:nvSpPr>
+          <p:cNvPr id="2" name="Slide Image Placeholder 1"/>
+          <p:cNvSpPr>
+            <a:spLocks noGrp="1" noRot="1" noChangeAspect="1"/>
+          </p:cNvSpPr>
+          <p:nvPr>
+            <p:ph type="sldImg"/>
+          </p:nvPr>
+        </p:nvSpPr>
+        <p:spPr/>
+      </p:sp>
+      <p:sp>
+        <p:nvSpPr>
+          <p:cNvPr id="3" name="Notes Placeholder 2"/>
+          <p:cNvSpPr>
+            <a:spLocks noGrp="1"/>
+          </p:cNvSpPr>
+          <p:nvPr>
+            <p:ph type="body" idx="1"/>
+          </p:nvPr>
+        </p:nvSpPr>
+        <p:spPr/>
+        <p:txBody>
+          <a:bodyPr/>
+          <a:lstStyle/>
+          <a:p>
+            <a:r>
+              <a:rPr lang="en-US" dirty="0" smtClean="0"/>
+              <a:t>In </a:t>
+            </a:r>
+            <a:r>
+              <a:rPr lang="en-US" dirty="0" err="1" smtClean="0"/>
+              <a:t>ArcMap</a:t>
+            </a:r>
+            <a:r>
+              <a:rPr lang="en-US" dirty="0" smtClean="0"/>
+              <a:t>, covariance can</a:t>
+            </a:r>
+            <a:r>
+              <a:rPr lang="en-US" baseline="0" dirty="0" smtClean="0"/>
+              <a:t> be displayed as </a:t>
+            </a:r>
+            <a:r>
+              <a:rPr lang="en-US" baseline="0" dirty="0" err="1" smtClean="0"/>
+              <a:t>univariate</a:t>
+            </a:r>
+            <a:r>
+              <a:rPr lang="en-US" baseline="0" dirty="0" smtClean="0"/>
+              <a:t> graphical.</a:t>
+            </a:r>
+            <a:endParaRPr lang="en-US" dirty="0"/>
+          </a:p>
+        </p:txBody>
+      </p:sp>
+      <p:sp>
+        <p:nvSpPr>
+          <p:cNvPr id="4" name="Slide Number Placeholder 3"/>
+          <p:cNvSpPr>
+            <a:spLocks noGrp="1"/>
+          </p:cNvSpPr>
+          <p:nvPr>
+            <p:ph type="sldNum" sz="quarter" idx="10"/>
+          </p:nvPr>
+        </p:nvSpPr>
+        <p:spPr/>
+        <p:txBody>
+          <a:bodyPr/>
+          <a:lstStyle/>
+          <a:p>
+            <a:fld id="{CC5A1FCD-79C7-4337-B79E-A51417706FB1}" type="slidenum">
+              <a:rPr lang="en-US" smtClean="0"/>
+              <a:t>18</a:t>
+            </a:fld>
+            <a:endParaRPr lang="en-US"/>
+          </a:p>
+        </p:txBody>
+      </p:sp>
+    </p:spTree>
+    <p:extLst>
+      <p:ext uri="{BB962C8B-B14F-4D97-AF65-F5344CB8AC3E}">
+        <p14:creationId xmlns:p14="http://schemas.microsoft.com/office/powerpoint/2010/main" val="3757913979"/>
+      </p:ext>
+    </p:extLst>
+  </p:cSld>
+  <p:clrMapOvr>
+    <a:masterClrMapping/>
+  </p:clrMapOvr>
+</p:notes>
+</file>
+
+<file path=ppt/notesSlides/notesSlide19.xml><?xml version="1.0" encoding="utf-8"?>
+<p:notes xmlns:a="http://schemas.openxmlformats.org/drawingml/2006/main" xmlns:r="http://schemas.openxmlformats.org/officeDocument/2006/relationships" xmlns:p="http://schemas.openxmlformats.org/presentationml/2006/main">
+  <p:cSld>
+    <p:spTree>
+      <p:nvGrpSpPr>
+        <p:cNvPr id="1" name=""/>
+        <p:cNvGrpSpPr/>
+        <p:nvPr/>
+      </p:nvGrpSpPr>
+      <p:grpSpPr>
+        <a:xfrm>
+          <a:off x="0" y="0"/>
+          <a:ext cx="0" cy="0"/>
+          <a:chOff x="0" y="0"/>
+          <a:chExt cx="0" cy="0"/>
+        </a:xfrm>
+      </p:grpSpPr>
+      <p:sp>
+        <p:nvSpPr>
+          <p:cNvPr id="2" name="Slide Image Placeholder 1"/>
+          <p:cNvSpPr>
+            <a:spLocks noGrp="1" noRot="1" noChangeAspect="1"/>
+          </p:cNvSpPr>
+          <p:nvPr>
+            <p:ph type="sldImg"/>
+          </p:nvPr>
+        </p:nvSpPr>
+        <p:spPr/>
+      </p:sp>
+      <p:sp>
+        <p:nvSpPr>
+          <p:cNvPr id="3" name="Notes Placeholder 2"/>
+          <p:cNvSpPr>
+            <a:spLocks noGrp="1"/>
+          </p:cNvSpPr>
+          <p:nvPr>
+            <p:ph type="body" idx="1"/>
+          </p:nvPr>
+        </p:nvSpPr>
+        <p:spPr/>
+        <p:txBody>
+          <a:bodyPr/>
+          <a:lstStyle/>
+          <a:p>
+            <a:r>
+              <a:rPr lang="en-US" dirty="0" smtClean="0"/>
+              <a:t>Boxplots rely</a:t>
+            </a:r>
+            <a:r>
+              <a:rPr lang="en-US" baseline="0" dirty="0" smtClean="0"/>
+              <a:t> on robust statistics like median and IQR rather than more sensitive ones like mean and standard deviation. </a:t>
+            </a:r>
+            <a:endParaRPr lang="en-US" dirty="0"/>
+          </a:p>
+        </p:txBody>
+      </p:sp>
+      <p:sp>
+        <p:nvSpPr>
+          <p:cNvPr id="4" name="Slide Number Placeholder 3"/>
+          <p:cNvSpPr>
+            <a:spLocks noGrp="1"/>
+          </p:cNvSpPr>
+          <p:nvPr>
+            <p:ph type="sldNum" sz="quarter" idx="10"/>
+          </p:nvPr>
+        </p:nvSpPr>
+        <p:spPr/>
+        <p:txBody>
+          <a:bodyPr/>
+          <a:lstStyle/>
+          <a:p>
+            <a:fld id="{CC5A1FCD-79C7-4337-B79E-A51417706FB1}" type="slidenum">
+              <a:rPr lang="en-US" smtClean="0"/>
+              <a:t>20</a:t>
+            </a:fld>
+            <a:endParaRPr lang="en-US"/>
+          </a:p>
+        </p:txBody>
+      </p:sp>
+    </p:spTree>
+    <p:extLst>
+      <p:ext uri="{BB962C8B-B14F-4D97-AF65-F5344CB8AC3E}">
+        <p14:creationId xmlns:p14="http://schemas.microsoft.com/office/powerpoint/2010/main" val="2647584444"/>
       </p:ext>
     </p:extLst>
   </p:cSld>
@@ -672,140 +1676,7 @@
           <a:bodyPr/>
           <a:lstStyle/>
           <a:p>
-            <a:r>
-              <a:rPr lang="en-US" dirty="0" smtClean="0"/>
-              <a:t>QQ plot is a standardization of your data where 0 is the mean, 1 and 2 are 1 and 2 standard deviations.</a:t>
-            </a:r>
-          </a:p>
-          <a:p>
-            <a:endParaRPr lang="en-US" dirty="0"/>
-          </a:p>
-          <a:p>
-            <a:r>
-              <a:rPr lang="en-US" dirty="0"/>
-              <a:t>The standard score of a raw score </a:t>
-            </a:r>
-            <a:r>
-              <a:rPr lang="en-US" i="1" dirty="0"/>
-              <a:t>x</a:t>
-            </a:r>
-            <a:r>
-              <a:rPr lang="en-US" dirty="0"/>
-              <a:t> </a:t>
-            </a:r>
-            <a:r>
-              <a:rPr lang="en-US" baseline="30000" dirty="0">
-                <a:hlinkClick r:id="rId3"/>
-              </a:rPr>
-              <a:t>[1]</a:t>
-            </a:r>
-            <a:r>
-              <a:rPr lang="en-US" dirty="0"/>
-              <a:t> </a:t>
-            </a:r>
-            <a:r>
-              <a:rPr lang="en-US" dirty="0" smtClean="0"/>
-              <a:t>is</a:t>
-            </a:r>
-          </a:p>
-          <a:p>
-            <a:r>
-              <a:rPr lang="en-US" dirty="0" smtClean="0"/>
-              <a:t>Z = </a:t>
-            </a:r>
-            <a:r>
-              <a:rPr lang="en-US" smtClean="0"/>
-              <a:t>x-</a:t>
-            </a:r>
-            <a:r>
-              <a:rPr lang="en-US" i="1"/>
-              <a:t> </a:t>
-            </a:r>
-            <a:r>
-              <a:rPr lang="en-US" i="1" smtClean="0"/>
-              <a:t>μ/</a:t>
-            </a:r>
-            <a:r>
-              <a:rPr lang="en-US" i="1"/>
-              <a:t>σ</a:t>
-            </a:r>
-            <a:endParaRPr lang="en-US" dirty="0"/>
-          </a:p>
-          <a:p>
-            <a:r>
-              <a:rPr lang="en-US" dirty="0"/>
-              <a:t>where:</a:t>
-            </a:r>
-          </a:p>
-          <a:p>
-            <a:r>
-              <a:rPr lang="en-US" i="1" dirty="0"/>
-              <a:t>μ</a:t>
-            </a:r>
-            <a:r>
-              <a:rPr lang="en-US" dirty="0"/>
-              <a:t> is the </a:t>
-            </a:r>
-            <a:r>
-              <a:rPr lang="en-US" dirty="0">
-                <a:hlinkClick r:id="rId4" tooltip="Mean"/>
-              </a:rPr>
-              <a:t>mean</a:t>
-            </a:r>
-            <a:r>
-              <a:rPr lang="en-US" dirty="0"/>
-              <a:t> of the </a:t>
-            </a:r>
-            <a:r>
-              <a:rPr lang="en-US" dirty="0" err="1"/>
-              <a:t>population;</a:t>
-            </a:r>
-            <a:r>
-              <a:rPr lang="en-US" i="1" dirty="0" err="1"/>
-              <a:t>σ</a:t>
-            </a:r>
-            <a:r>
-              <a:rPr lang="en-US" dirty="0"/>
-              <a:t> is the </a:t>
-            </a:r>
-            <a:r>
-              <a:rPr lang="en-US" dirty="0">
-                <a:hlinkClick r:id="rId5" tooltip="Standard deviation"/>
-              </a:rPr>
-              <a:t>standard deviation</a:t>
-            </a:r>
-            <a:r>
-              <a:rPr lang="en-US" dirty="0"/>
-              <a:t> of the population.</a:t>
-            </a:r>
-          </a:p>
-          <a:p>
-            <a:endParaRPr lang="en-US" dirty="0" smtClean="0"/>
-          </a:p>
-          <a:p>
-            <a:r>
-              <a:rPr lang="en-US" dirty="0" smtClean="0"/>
-              <a:t>If data is normal, there will be a 1:1 relationship between sample data and the data from a normal curve. Sample data will be points, normal is the solid line.</a:t>
-            </a:r>
-          </a:p>
-          <a:p>
-            <a:endParaRPr lang="en-US" dirty="0"/>
-          </a:p>
-          <a:p>
-            <a:r>
-              <a:rPr lang="en-US" dirty="0" smtClean="0"/>
-              <a:t>If there is deviation, it is usually on the low or high end, which may be ok and close enough to normal to consider as such.</a:t>
-            </a:r>
-          </a:p>
-          <a:p>
-            <a:endParaRPr lang="en-US" dirty="0"/>
-          </a:p>
-          <a:p>
-            <a:r>
-              <a:rPr lang="en-US" dirty="0" smtClean="0"/>
-              <a:t>If there is deviation from the normal line around 0, data is definitely not normal.</a:t>
-            </a:r>
-            <a:endParaRPr lang="en-US" dirty="0"/>
+            <a:endParaRPr lang="en-US"/>
           </a:p>
         </p:txBody>
       </p:sp>
@@ -826,7 +1697,7 @@
           <a:p>
             <a:fld id="{CC5A1FCD-79C7-4337-B79E-A51417706FB1}" type="slidenum">
               <a:rPr lang="en-US" smtClean="0"/>
-              <a:t>13</a:t>
+              <a:t>2</a:t>
             </a:fld>
             <a:endParaRPr lang="en-US"/>
           </a:p>
@@ -835,7 +1706,7 @@
     </p:spTree>
     <p:extLst>
       <p:ext uri="{BB962C8B-B14F-4D97-AF65-F5344CB8AC3E}">
-        <p14:creationId xmlns:p14="http://schemas.microsoft.com/office/powerpoint/2010/main" val="725128415"/>
+        <p14:creationId xmlns:p14="http://schemas.microsoft.com/office/powerpoint/2010/main" val="2674033542"/>
       </p:ext>
     </p:extLst>
   </p:cSld>
@@ -889,15 +1760,7 @@
           <a:bodyPr/>
           <a:lstStyle/>
           <a:p>
-            <a:r>
-              <a:rPr lang="en-US" dirty="0" smtClean="0"/>
-              <a:t>Multicolinearity: highly correlated</a:t>
-            </a:r>
-            <a:r>
-              <a:rPr lang="en-US" baseline="0" dirty="0" smtClean="0"/>
-              <a:t> variables that can contribute to over-fitting a model, lowering its predictive ability and inflating it’s validation statistics</a:t>
-            </a:r>
-            <a:endParaRPr lang="en-US" dirty="0"/>
+            <a:endParaRPr lang="en-US"/>
           </a:p>
         </p:txBody>
       </p:sp>
@@ -918,7 +1781,7 @@
           <a:p>
             <a:fld id="{CC5A1FCD-79C7-4337-B79E-A51417706FB1}" type="slidenum">
               <a:rPr lang="en-US" smtClean="0"/>
-              <a:t>15</a:t>
+              <a:t>3</a:t>
             </a:fld>
             <a:endParaRPr lang="en-US"/>
           </a:p>
@@ -927,7 +1790,7 @@
     </p:spTree>
     <p:extLst>
       <p:ext uri="{BB962C8B-B14F-4D97-AF65-F5344CB8AC3E}">
-        <p14:creationId xmlns:p14="http://schemas.microsoft.com/office/powerpoint/2010/main" val="2625421777"/>
+        <p14:creationId xmlns:p14="http://schemas.microsoft.com/office/powerpoint/2010/main" val="1003731876"/>
       </p:ext>
     </p:extLst>
   </p:cSld>
@@ -981,28 +1844,7 @@
           <a:bodyPr/>
           <a:lstStyle/>
           <a:p>
-            <a:pPr lvl="1"/>
-            <a:r>
-              <a:rPr lang="en-US" dirty="0" smtClean="0"/>
-              <a:t>Spearman’s Rho: non-parametric technique that quantifies the degree of linear association between the ranks of data</a:t>
-            </a:r>
-          </a:p>
-          <a:p>
-            <a:pPr lvl="1"/>
-            <a:r>
-              <a:rPr lang="en-US" dirty="0" smtClean="0"/>
-              <a:t>Pearson’s Coefficient: parametric technique that measures the degree of linear relationship between data</a:t>
-            </a:r>
-          </a:p>
-          <a:p>
-            <a:pPr lvl="1"/>
-            <a:r>
-              <a:rPr lang="en-US" dirty="0" smtClean="0"/>
-              <a:t>Kendall’s Tau: non-parametric measure of association based on the number of concordances and discordances in paired observations</a:t>
-            </a:r>
-          </a:p>
-          <a:p>
-            <a:endParaRPr lang="en-US" dirty="0"/>
+            <a:endParaRPr lang="en-US"/>
           </a:p>
         </p:txBody>
       </p:sp>
@@ -1023,7 +1865,7 @@
           <a:p>
             <a:fld id="{CC5A1FCD-79C7-4337-B79E-A51417706FB1}" type="slidenum">
               <a:rPr lang="en-US" smtClean="0"/>
-              <a:t>16</a:t>
+              <a:t>4</a:t>
             </a:fld>
             <a:endParaRPr lang="en-US"/>
           </a:p>
@@ -1032,7 +1874,7 @@
     </p:spTree>
     <p:extLst>
       <p:ext uri="{BB962C8B-B14F-4D97-AF65-F5344CB8AC3E}">
-        <p14:creationId xmlns:p14="http://schemas.microsoft.com/office/powerpoint/2010/main" val="3757913979"/>
+        <p14:creationId xmlns:p14="http://schemas.microsoft.com/office/powerpoint/2010/main" val="2194546533"/>
       </p:ext>
     </p:extLst>
   </p:cSld>
@@ -1086,11 +1928,7 @@
           <a:bodyPr/>
           <a:lstStyle/>
           <a:p>
-            <a:r>
-              <a:rPr lang="en-US" dirty="0" smtClean="0"/>
-              <a:t>Covariance matrix calculated in R</a:t>
-            </a:r>
-            <a:endParaRPr lang="en-US" dirty="0"/>
+            <a:endParaRPr lang="en-US"/>
           </a:p>
         </p:txBody>
       </p:sp>
@@ -1111,7 +1949,7 @@
           <a:p>
             <a:fld id="{CC5A1FCD-79C7-4337-B79E-A51417706FB1}" type="slidenum">
               <a:rPr lang="en-US" smtClean="0"/>
-              <a:t>17</a:t>
+              <a:t>5</a:t>
             </a:fld>
             <a:endParaRPr lang="en-US"/>
           </a:p>
@@ -1120,7 +1958,7 @@
     </p:spTree>
     <p:extLst>
       <p:ext uri="{BB962C8B-B14F-4D97-AF65-F5344CB8AC3E}">
-        <p14:creationId xmlns:p14="http://schemas.microsoft.com/office/powerpoint/2010/main" val="3810249284"/>
+        <p14:creationId xmlns:p14="http://schemas.microsoft.com/office/powerpoint/2010/main" val="1834077986"/>
       </p:ext>
     </p:extLst>
   </p:cSld>
@@ -1176,27 +2014,40 @@
           <a:p>
             <a:r>
               <a:rPr lang="en-US" dirty="0" smtClean="0"/>
-              <a:t>In </a:t>
-            </a:r>
-            <a:r>
-              <a:rPr lang="en-US" dirty="0" err="1" smtClean="0"/>
-              <a:t>ArcMap</a:t>
-            </a:r>
-            <a:r>
-              <a:rPr lang="en-US" dirty="0" smtClean="0"/>
-              <a:t>, covariance can</a:t>
+              <a:t>The descriptiv</a:t>
             </a:r>
             <a:r>
               <a:rPr lang="en-US" baseline="0" dirty="0" smtClean="0"/>
-              <a:t> be displayed as </a:t>
+              <a:t>e statistics like mean, standard deviation, IQR, </a:t>
             </a:r>
             <a:r>
               <a:rPr lang="en-US" baseline="0" dirty="0" err="1" smtClean="0"/>
-              <a:t>univariate</a:t>
+              <a:t>skewness</a:t>
             </a:r>
             <a:r>
               <a:rPr lang="en-US" baseline="0" dirty="0" smtClean="0"/>
-              <a:t> graphical.</a:t>
+              <a:t>, and kurtosis describe the distribution of the data. A normal distribution has a mean of 0, standard deviation of 1, </a:t>
+            </a:r>
+            <a:r>
+              <a:rPr lang="en-US" baseline="0" dirty="0" err="1" smtClean="0"/>
+              <a:t>skewness</a:t>
+            </a:r>
+            <a:r>
+              <a:rPr lang="en-US" baseline="0" dirty="0" smtClean="0"/>
+              <a:t> of 0, and kurtosis of 0. </a:t>
+            </a:r>
+          </a:p>
+          <a:p>
+            <a:endParaRPr lang="en-US" baseline="0" dirty="0" smtClean="0"/>
+          </a:p>
+          <a:p>
+            <a:r>
+              <a:rPr lang="en-US" dirty="0" smtClean="0"/>
+              <a:t>You can correct for normality</a:t>
+            </a:r>
+            <a:r>
+              <a:rPr lang="en-US" baseline="0" dirty="0" smtClean="0"/>
+              <a:t> in multiple ways: delete outliers, log-transform, square root transform, </a:t>
             </a:r>
             <a:endParaRPr lang="en-US" dirty="0"/>
           </a:p>
@@ -1219,7 +2070,7 @@
           <a:p>
             <a:fld id="{CC5A1FCD-79C7-4337-B79E-A51417706FB1}" type="slidenum">
               <a:rPr lang="en-US" smtClean="0"/>
-              <a:t>18</a:t>
+              <a:t>6</a:t>
             </a:fld>
             <a:endParaRPr lang="en-US"/>
           </a:p>
@@ -1228,7 +2079,7 @@
     </p:spTree>
     <p:extLst>
       <p:ext uri="{BB962C8B-B14F-4D97-AF65-F5344CB8AC3E}">
-        <p14:creationId xmlns:p14="http://schemas.microsoft.com/office/powerpoint/2010/main" val="3757913979"/>
+        <p14:creationId xmlns:p14="http://schemas.microsoft.com/office/powerpoint/2010/main" val="792934042"/>
       </p:ext>
     </p:extLst>
   </p:cSld>
@@ -1282,15 +2133,7 @@
           <a:bodyPr/>
           <a:lstStyle/>
           <a:p>
-            <a:r>
-              <a:rPr lang="en-US" dirty="0" smtClean="0"/>
-              <a:t>Boxplots rely</a:t>
-            </a:r>
-            <a:r>
-              <a:rPr lang="en-US" baseline="0" dirty="0" smtClean="0"/>
-              <a:t> on robust statistics like median and IQR rather than more sensitive ones like mean and standard deviation. </a:t>
-            </a:r>
-            <a:endParaRPr lang="en-US" dirty="0"/>
+            <a:endParaRPr lang="en-US"/>
           </a:p>
         </p:txBody>
       </p:sp>
@@ -1311,7 +2154,7 @@
           <a:p>
             <a:fld id="{CC5A1FCD-79C7-4337-B79E-A51417706FB1}" type="slidenum">
               <a:rPr lang="en-US" smtClean="0"/>
-              <a:t>20</a:t>
+              <a:t>7</a:t>
             </a:fld>
             <a:endParaRPr lang="en-US"/>
           </a:p>
@@ -1320,7 +2163,175 @@
     </p:spTree>
     <p:extLst>
       <p:ext uri="{BB962C8B-B14F-4D97-AF65-F5344CB8AC3E}">
-        <p14:creationId xmlns:p14="http://schemas.microsoft.com/office/powerpoint/2010/main" val="2647584444"/>
+        <p14:creationId xmlns:p14="http://schemas.microsoft.com/office/powerpoint/2010/main" val="1907667813"/>
+      </p:ext>
+    </p:extLst>
+  </p:cSld>
+  <p:clrMapOvr>
+    <a:masterClrMapping/>
+  </p:clrMapOvr>
+</p:notes>
+</file>
+
+<file path=ppt/notesSlides/notesSlide8.xml><?xml version="1.0" encoding="utf-8"?>
+<p:notes xmlns:a="http://schemas.openxmlformats.org/drawingml/2006/main" xmlns:r="http://schemas.openxmlformats.org/officeDocument/2006/relationships" xmlns:p="http://schemas.openxmlformats.org/presentationml/2006/main">
+  <p:cSld>
+    <p:spTree>
+      <p:nvGrpSpPr>
+        <p:cNvPr id="1" name=""/>
+        <p:cNvGrpSpPr/>
+        <p:nvPr/>
+      </p:nvGrpSpPr>
+      <p:grpSpPr>
+        <a:xfrm>
+          <a:off x="0" y="0"/>
+          <a:ext cx="0" cy="0"/>
+          <a:chOff x="0" y="0"/>
+          <a:chExt cx="0" cy="0"/>
+        </a:xfrm>
+      </p:grpSpPr>
+      <p:sp>
+        <p:nvSpPr>
+          <p:cNvPr id="2" name="Slide Image Placeholder 1"/>
+          <p:cNvSpPr>
+            <a:spLocks noGrp="1" noRot="1" noChangeAspect="1"/>
+          </p:cNvSpPr>
+          <p:nvPr>
+            <p:ph type="sldImg"/>
+          </p:nvPr>
+        </p:nvSpPr>
+        <p:spPr/>
+      </p:sp>
+      <p:sp>
+        <p:nvSpPr>
+          <p:cNvPr id="3" name="Notes Placeholder 2"/>
+          <p:cNvSpPr>
+            <a:spLocks noGrp="1"/>
+          </p:cNvSpPr>
+          <p:nvPr>
+            <p:ph type="body" idx="1"/>
+          </p:nvPr>
+        </p:nvSpPr>
+        <p:spPr/>
+        <p:txBody>
+          <a:bodyPr/>
+          <a:lstStyle/>
+          <a:p>
+            <a:endParaRPr lang="en-US"/>
+          </a:p>
+        </p:txBody>
+      </p:sp>
+      <p:sp>
+        <p:nvSpPr>
+          <p:cNvPr id="4" name="Slide Number Placeholder 3"/>
+          <p:cNvSpPr>
+            <a:spLocks noGrp="1"/>
+          </p:cNvSpPr>
+          <p:nvPr>
+            <p:ph type="sldNum" sz="quarter" idx="10"/>
+          </p:nvPr>
+        </p:nvSpPr>
+        <p:spPr/>
+        <p:txBody>
+          <a:bodyPr/>
+          <a:lstStyle/>
+          <a:p>
+            <a:fld id="{CC5A1FCD-79C7-4337-B79E-A51417706FB1}" type="slidenum">
+              <a:rPr lang="en-US" smtClean="0"/>
+              <a:t>8</a:t>
+            </a:fld>
+            <a:endParaRPr lang="en-US"/>
+          </a:p>
+        </p:txBody>
+      </p:sp>
+    </p:spTree>
+    <p:extLst>
+      <p:ext uri="{BB962C8B-B14F-4D97-AF65-F5344CB8AC3E}">
+        <p14:creationId xmlns:p14="http://schemas.microsoft.com/office/powerpoint/2010/main" val="2161877743"/>
+      </p:ext>
+    </p:extLst>
+  </p:cSld>
+  <p:clrMapOvr>
+    <a:masterClrMapping/>
+  </p:clrMapOvr>
+</p:notes>
+</file>
+
+<file path=ppt/notesSlides/notesSlide9.xml><?xml version="1.0" encoding="utf-8"?>
+<p:notes xmlns:a="http://schemas.openxmlformats.org/drawingml/2006/main" xmlns:r="http://schemas.openxmlformats.org/officeDocument/2006/relationships" xmlns:p="http://schemas.openxmlformats.org/presentationml/2006/main">
+  <p:cSld>
+    <p:spTree>
+      <p:nvGrpSpPr>
+        <p:cNvPr id="1" name=""/>
+        <p:cNvGrpSpPr/>
+        <p:nvPr/>
+      </p:nvGrpSpPr>
+      <p:grpSpPr>
+        <a:xfrm>
+          <a:off x="0" y="0"/>
+          <a:ext cx="0" cy="0"/>
+          <a:chOff x="0" y="0"/>
+          <a:chExt cx="0" cy="0"/>
+        </a:xfrm>
+      </p:grpSpPr>
+      <p:sp>
+        <p:nvSpPr>
+          <p:cNvPr id="2" name="Slide Image Placeholder 1"/>
+          <p:cNvSpPr>
+            <a:spLocks noGrp="1" noRot="1" noChangeAspect="1"/>
+          </p:cNvSpPr>
+          <p:nvPr>
+            <p:ph type="sldImg"/>
+          </p:nvPr>
+        </p:nvSpPr>
+        <p:spPr/>
+      </p:sp>
+      <p:sp>
+        <p:nvSpPr>
+          <p:cNvPr id="3" name="Notes Placeholder 2"/>
+          <p:cNvSpPr>
+            <a:spLocks noGrp="1"/>
+          </p:cNvSpPr>
+          <p:nvPr>
+            <p:ph type="body" idx="1"/>
+          </p:nvPr>
+        </p:nvSpPr>
+        <p:spPr/>
+        <p:txBody>
+          <a:bodyPr/>
+          <a:lstStyle/>
+          <a:p>
+            <a:endParaRPr lang="en-US"/>
+          </a:p>
+        </p:txBody>
+      </p:sp>
+      <p:sp>
+        <p:nvSpPr>
+          <p:cNvPr id="4" name="Slide Number Placeholder 3"/>
+          <p:cNvSpPr>
+            <a:spLocks noGrp="1"/>
+          </p:cNvSpPr>
+          <p:nvPr>
+            <p:ph type="sldNum" sz="quarter" idx="10"/>
+          </p:nvPr>
+        </p:nvSpPr>
+        <p:spPr/>
+        <p:txBody>
+          <a:bodyPr/>
+          <a:lstStyle/>
+          <a:p>
+            <a:fld id="{CC5A1FCD-79C7-4337-B79E-A51417706FB1}" type="slidenum">
+              <a:rPr lang="en-US" smtClean="0"/>
+              <a:t>9</a:t>
+            </a:fld>
+            <a:endParaRPr lang="en-US"/>
+          </a:p>
+        </p:txBody>
+      </p:sp>
+    </p:spTree>
+    <p:extLst>
+      <p:ext uri="{BB962C8B-B14F-4D97-AF65-F5344CB8AC3E}">
+        <p14:creationId xmlns:p14="http://schemas.microsoft.com/office/powerpoint/2010/main" val="844232612"/>
       </p:ext>
     </p:extLst>
   </p:cSld>
@@ -1511,7 +2522,7 @@
           <a:p>
             <a:fld id="{97CFF939-70E9-4E47-9899-4E3DA2789027}" type="datetimeFigureOut">
               <a:rPr lang="en-US" smtClean="0"/>
-              <a:t>8/1/2014</a:t>
+              <a:t>3/10/2017</a:t>
             </a:fld>
             <a:endParaRPr lang="en-US"/>
           </a:p>
@@ -1681,7 +2692,7 @@
           <a:p>
             <a:fld id="{97CFF939-70E9-4E47-9899-4E3DA2789027}" type="datetimeFigureOut">
               <a:rPr lang="en-US" smtClean="0"/>
-              <a:t>8/1/2014</a:t>
+              <a:t>3/10/2017</a:t>
             </a:fld>
             <a:endParaRPr lang="en-US"/>
           </a:p>
@@ -1861,7 +2872,7 @@
           <a:p>
             <a:fld id="{97CFF939-70E9-4E47-9899-4E3DA2789027}" type="datetimeFigureOut">
               <a:rPr lang="en-US" smtClean="0"/>
-              <a:t>8/1/2014</a:t>
+              <a:t>3/10/2017</a:t>
             </a:fld>
             <a:endParaRPr lang="en-US"/>
           </a:p>
@@ -2031,7 +3042,7 @@
           <a:p>
             <a:fld id="{97CFF939-70E9-4E47-9899-4E3DA2789027}" type="datetimeFigureOut">
               <a:rPr lang="en-US" smtClean="0"/>
-              <a:t>8/1/2014</a:t>
+              <a:t>3/10/2017</a:t>
             </a:fld>
             <a:endParaRPr lang="en-US"/>
           </a:p>
@@ -2277,7 +3288,7 @@
           <a:p>
             <a:fld id="{97CFF939-70E9-4E47-9899-4E3DA2789027}" type="datetimeFigureOut">
               <a:rPr lang="en-US" smtClean="0"/>
-              <a:t>8/1/2014</a:t>
+              <a:t>3/10/2017</a:t>
             </a:fld>
             <a:endParaRPr lang="en-US"/>
           </a:p>
@@ -2565,7 +3576,7 @@
           <a:p>
             <a:fld id="{97CFF939-70E9-4E47-9899-4E3DA2789027}" type="datetimeFigureOut">
               <a:rPr lang="en-US" smtClean="0"/>
-              <a:t>8/1/2014</a:t>
+              <a:t>3/10/2017</a:t>
             </a:fld>
             <a:endParaRPr lang="en-US"/>
           </a:p>
@@ -2987,7 +3998,7 @@
           <a:p>
             <a:fld id="{97CFF939-70E9-4E47-9899-4E3DA2789027}" type="datetimeFigureOut">
               <a:rPr lang="en-US" smtClean="0"/>
-              <a:t>8/1/2014</a:t>
+              <a:t>3/10/2017</a:t>
             </a:fld>
             <a:endParaRPr lang="en-US"/>
           </a:p>
@@ -3105,7 +4116,7 @@
           <a:p>
             <a:fld id="{97CFF939-70E9-4E47-9899-4E3DA2789027}" type="datetimeFigureOut">
               <a:rPr lang="en-US" smtClean="0"/>
-              <a:t>8/1/2014</a:t>
+              <a:t>3/10/2017</a:t>
             </a:fld>
             <a:endParaRPr lang="en-US"/>
           </a:p>
@@ -3200,7 +4211,7 @@
           <a:p>
             <a:fld id="{97CFF939-70E9-4E47-9899-4E3DA2789027}" type="datetimeFigureOut">
               <a:rPr lang="en-US" smtClean="0"/>
-              <a:t>8/1/2014</a:t>
+              <a:t>3/10/2017</a:t>
             </a:fld>
             <a:endParaRPr lang="en-US"/>
           </a:p>
@@ -3477,7 +4488,7 @@
           <a:p>
             <a:fld id="{97CFF939-70E9-4E47-9899-4E3DA2789027}" type="datetimeFigureOut">
               <a:rPr lang="en-US" smtClean="0"/>
-              <a:t>8/1/2014</a:t>
+              <a:t>3/10/2017</a:t>
             </a:fld>
             <a:endParaRPr lang="en-US"/>
           </a:p>
@@ -3730,7 +4741,7 @@
           <a:p>
             <a:fld id="{97CFF939-70E9-4E47-9899-4E3DA2789027}" type="datetimeFigureOut">
               <a:rPr lang="en-US" smtClean="0"/>
-              <a:t>8/1/2014</a:t>
+              <a:t>3/10/2017</a:t>
             </a:fld>
             <a:endParaRPr lang="en-US"/>
           </a:p>
@@ -3943,7 +4954,7 @@
           <a:p>
             <a:fld id="{97CFF939-70E9-4E47-9899-4E3DA2789027}" type="datetimeFigureOut">
               <a:rPr lang="en-US" smtClean="0"/>
-              <a:t>8/1/2014</a:t>
+              <a:t>3/10/2017</a:t>
             </a:fld>
             <a:endParaRPr lang="en-US"/>
           </a:p>
@@ -4447,7 +5458,13 @@
             <p:nvPr/>
           </p:nvPicPr>
           <p:blipFill>
-            <a:blip r:embed="rId2" cstate="print"/>
+            <a:blip r:embed="rId3" cstate="print">
+              <a:extLst>
+                <a:ext uri="{28A0092B-C50C-407E-A947-70E740481C1C}">
+                  <a14:useLocalDpi xmlns:a14="http://schemas.microsoft.com/office/drawing/2010/main" val="0"/>
+                </a:ext>
+              </a:extLst>
+            </a:blip>
             <a:srcRect/>
             <a:stretch>
               <a:fillRect/>
@@ -4605,7 +5622,13 @@
             <p:nvPr/>
           </p:nvPicPr>
           <p:blipFill rotWithShape="1">
-            <a:blip r:embed="rId3" cstate="print"/>
+            <a:blip r:embed="rId4" cstate="print">
+              <a:extLst>
+                <a:ext uri="{28A0092B-C50C-407E-A947-70E740481C1C}">
+                  <a14:useLocalDpi xmlns:a14="http://schemas.microsoft.com/office/drawing/2010/main" val="0"/>
+                </a:ext>
+              </a:extLst>
+            </a:blip>
             <a:srcRect b="9207"/>
             <a:stretch/>
           </p:blipFill>
@@ -4818,14 +5841,14 @@
             <p:nvPr/>
           </p:nvPicPr>
           <p:blipFill rotWithShape="1">
-            <a:blip r:embed="rId4">
+            <a:blip r:embed="rId5" cstate="print">
               <a:extLst>
                 <a:ext uri="{28A0092B-C50C-407E-A947-70E740481C1C}">
                   <a14:useLocalDpi xmlns:a14="http://schemas.microsoft.com/office/drawing/2010/main" val="0"/>
                 </a:ext>
               </a:extLst>
             </a:blip>
-            <a:srcRect l="1263" t="16301" r="52658" b="40439"/>
+            <a:srcRect/>
             <a:stretch/>
           </p:blipFill>
           <p:spPr bwMode="auto">
@@ -5155,7 +6178,7 @@
           <p:nvPr/>
         </p:nvPicPr>
         <p:blipFill>
-          <a:blip r:embed="rId2">
+          <a:blip r:embed="rId3">
             <a:extLst>
               <a:ext uri="{28A0092B-C50C-407E-A947-70E740481C1C}">
                 <a14:useLocalDpi xmlns:a14="http://schemas.microsoft.com/office/drawing/2010/main" val="0"/>
@@ -5204,14 +6227,14 @@
           <p:nvPr/>
         </p:nvPicPr>
         <p:blipFill rotWithShape="1">
-          <a:blip r:embed="rId3">
+          <a:blip r:embed="rId4" cstate="print">
             <a:extLst>
               <a:ext uri="{28A0092B-C50C-407E-A947-70E740481C1C}">
                 <a14:useLocalDpi xmlns:a14="http://schemas.microsoft.com/office/drawing/2010/main" val="0"/>
               </a:ext>
             </a:extLst>
           </a:blip>
-          <a:srcRect l="20487" t="14845" r="7727" b="9892"/>
+          <a:srcRect/>
           <a:stretch/>
         </p:blipFill>
         <p:spPr bwMode="auto">
@@ -5448,7 +6471,7 @@
           <p:nvPr/>
         </p:nvPicPr>
         <p:blipFill>
-          <a:blip r:embed="rId2">
+          <a:blip r:embed="rId3">
             <a:extLst>
               <a:ext uri="{28A0092B-C50C-407E-A947-70E740481C1C}">
                 <a14:useLocalDpi xmlns:a14="http://schemas.microsoft.com/office/drawing/2010/main" val="0"/>
@@ -5502,7 +6525,7 @@
           <p:nvPr/>
         </p:nvPicPr>
         <p:blipFill>
-          <a:blip r:embed="rId3">
+          <a:blip r:embed="rId4">
             <a:extLst>
               <a:ext uri="{28A0092B-C50C-407E-A947-70E740481C1C}">
                 <a14:useLocalDpi xmlns:a14="http://schemas.microsoft.com/office/drawing/2010/main" val="0"/>
@@ -5551,14 +6574,14 @@
           <p:nvPr/>
         </p:nvPicPr>
         <p:blipFill rotWithShape="1">
-          <a:blip r:embed="rId4">
+          <a:blip r:embed="rId5" cstate="print">
             <a:extLst>
               <a:ext uri="{28A0092B-C50C-407E-A947-70E740481C1C}">
                 <a14:useLocalDpi xmlns:a14="http://schemas.microsoft.com/office/drawing/2010/main" val="0"/>
               </a:ext>
             </a:extLst>
           </a:blip>
-          <a:srcRect l="45974" t="12662" r="4351" b="25852"/>
+          <a:srcRect/>
           <a:stretch/>
         </p:blipFill>
         <p:spPr bwMode="auto">
@@ -5899,14 +6922,14 @@
           <p:nvPr/>
         </p:nvPicPr>
         <p:blipFill rotWithShape="1">
-          <a:blip r:embed="rId3">
+          <a:blip r:embed="rId3" cstate="print">
             <a:extLst>
               <a:ext uri="{28A0092B-C50C-407E-A947-70E740481C1C}">
                 <a14:useLocalDpi xmlns:a14="http://schemas.microsoft.com/office/drawing/2010/main" val="0"/>
               </a:ext>
             </a:extLst>
           </a:blip>
-          <a:srcRect l="1753" t="18880" r="55325" b="22563"/>
+          <a:srcRect/>
           <a:stretch/>
         </p:blipFill>
         <p:spPr bwMode="auto">
@@ -6031,14 +7054,14 @@
           <p:nvPr/>
         </p:nvPicPr>
         <p:blipFill rotWithShape="1">
-          <a:blip r:embed="rId3">
+          <a:blip r:embed="rId3" cstate="print">
             <a:extLst>
               <a:ext uri="{28A0092B-C50C-407E-A947-70E740481C1C}">
                 <a14:useLocalDpi xmlns:a14="http://schemas.microsoft.com/office/drawing/2010/main" val="0"/>
               </a:ext>
             </a:extLst>
           </a:blip>
-          <a:srcRect l="1683" t="17736" r="68112" b="43118"/>
+          <a:srcRect/>
           <a:stretch/>
         </p:blipFill>
         <p:spPr bwMode="auto">
@@ -6138,14 +7161,14 @@
           <p:nvPr/>
         </p:nvPicPr>
         <p:blipFill rotWithShape="1">
-          <a:blip r:embed="rId3">
+          <a:blip r:embed="rId3" cstate="print">
             <a:extLst>
               <a:ext uri="{28A0092B-C50C-407E-A947-70E740481C1C}">
                 <a14:useLocalDpi xmlns:a14="http://schemas.microsoft.com/office/drawing/2010/main" val="0"/>
               </a:ext>
             </a:extLst>
           </a:blip>
-          <a:srcRect l="1026" t="3987" r="1892" b="1789"/>
+          <a:srcRect/>
           <a:stretch/>
         </p:blipFill>
         <p:spPr bwMode="auto">
@@ -6266,14 +7289,14 @@
           <p:nvPr/>
         </p:nvPicPr>
         <p:blipFill rotWithShape="1">
-          <a:blip r:embed="rId2">
+          <a:blip r:embed="rId2" cstate="print">
             <a:extLst>
               <a:ext uri="{28A0092B-C50C-407E-A947-70E740481C1C}">
                 <a14:useLocalDpi xmlns:a14="http://schemas.microsoft.com/office/drawing/2010/main" val="0"/>
               </a:ext>
             </a:extLst>
           </a:blip>
-          <a:srcRect l="2773" t="28137" r="12916" b="17661"/>
+          <a:srcRect/>
           <a:stretch/>
         </p:blipFill>
         <p:spPr bwMode="auto">
@@ -6645,14 +7668,14 @@
           <p:nvPr/>
         </p:nvPicPr>
         <p:blipFill rotWithShape="1">
-          <a:blip r:embed="rId2">
+          <a:blip r:embed="rId2" cstate="print">
             <a:extLst>
               <a:ext uri="{28A0092B-C50C-407E-A947-70E740481C1C}">
                 <a14:useLocalDpi xmlns:a14="http://schemas.microsoft.com/office/drawing/2010/main" val="0"/>
               </a:ext>
             </a:extLst>
           </a:blip>
-          <a:srcRect l="20487" t="14845" r="7727" b="9892"/>
+          <a:srcRect/>
           <a:stretch/>
         </p:blipFill>
         <p:spPr bwMode="auto">
@@ -6697,14 +7720,14 @@
           <p:nvPr/>
         </p:nvPicPr>
         <p:blipFill rotWithShape="1">
-          <a:blip r:embed="rId3">
+          <a:blip r:embed="rId3" cstate="print">
             <a:extLst>
               <a:ext uri="{28A0092B-C50C-407E-A947-70E740481C1C}">
                 <a14:useLocalDpi xmlns:a14="http://schemas.microsoft.com/office/drawing/2010/main" val="0"/>
               </a:ext>
             </a:extLst>
           </a:blip>
-          <a:srcRect l="45974" t="12662" r="4351" b="25852"/>
+          <a:srcRect/>
           <a:stretch/>
         </p:blipFill>
         <p:spPr bwMode="auto">
@@ -7236,7 +8259,7 @@
               </a:ext>
             </a:extLst>
           </a:blip>
-          <a:srcRect l="7031" t="1433" r="4367" b="7913"/>
+          <a:srcRect/>
           <a:stretch/>
         </p:blipFill>
         <p:spPr>
@@ -7351,7 +8374,7 @@
               </a:ext>
             </a:extLst>
           </a:blip>
-          <a:srcRect l="7031" t="1433" r="4367" b="7913"/>
+          <a:srcRect/>
           <a:stretch/>
         </p:blipFill>
         <p:spPr>
@@ -7378,14 +8401,14 @@
           <p:nvPr/>
         </p:nvPicPr>
         <p:blipFill rotWithShape="1">
-          <a:blip r:embed="rId3">
+          <a:blip r:embed="rId3" cstate="print">
             <a:extLst>
               <a:ext uri="{28A0092B-C50C-407E-A947-70E740481C1C}">
                 <a14:useLocalDpi xmlns:a14="http://schemas.microsoft.com/office/drawing/2010/main" val="0"/>
               </a:ext>
             </a:extLst>
           </a:blip>
-          <a:srcRect l="6404" t="2351" r="3820" b="7742"/>
+          <a:srcRect/>
           <a:stretch/>
         </p:blipFill>
         <p:spPr>
@@ -7532,14 +8555,14 @@
           <p:nvPr/>
         </p:nvPicPr>
         <p:blipFill rotWithShape="1">
-          <a:blip r:embed="rId2">
+          <a:blip r:embed="rId2" cstate="print">
             <a:extLst>
               <a:ext uri="{28A0092B-C50C-407E-A947-70E740481C1C}">
                 <a14:useLocalDpi xmlns:a14="http://schemas.microsoft.com/office/drawing/2010/main" val="0"/>
               </a:ext>
             </a:extLst>
           </a:blip>
-          <a:srcRect l="35344" t="30459" r="34638" b="4091"/>
+          <a:srcRect/>
           <a:stretch/>
         </p:blipFill>
         <p:spPr bwMode="auto">
@@ -7933,14 +8956,14 @@
           <p:nvPr/>
         </p:nvPicPr>
         <p:blipFill rotWithShape="1">
-          <a:blip r:embed="rId2">
+          <a:blip r:embed="rId2" cstate="print">
             <a:extLst>
               <a:ext uri="{28A0092B-C50C-407E-A947-70E740481C1C}">
                 <a14:useLocalDpi xmlns:a14="http://schemas.microsoft.com/office/drawing/2010/main" val="0"/>
               </a:ext>
             </a:extLst>
           </a:blip>
-          <a:srcRect l="28450" t="9862" r="53649" b="72096"/>
+          <a:srcRect/>
           <a:stretch/>
         </p:blipFill>
         <p:spPr bwMode="auto">
@@ -7980,14 +9003,14 @@
           <p:nvPr/>
         </p:nvPicPr>
         <p:blipFill rotWithShape="1">
-          <a:blip r:embed="rId3">
+          <a:blip r:embed="rId3" cstate="print">
             <a:extLst>
               <a:ext uri="{28A0092B-C50C-407E-A947-70E740481C1C}">
                 <a14:useLocalDpi xmlns:a14="http://schemas.microsoft.com/office/drawing/2010/main" val="0"/>
               </a:ext>
             </a:extLst>
           </a:blip>
-          <a:srcRect t="44413" r="69128" b="41350"/>
+          <a:srcRect/>
           <a:stretch/>
         </p:blipFill>
         <p:spPr bwMode="auto">
@@ -8145,14 +9168,14 @@
           <p:nvPr/>
         </p:nvPicPr>
         <p:blipFill rotWithShape="1">
-          <a:blip r:embed="rId2">
+          <a:blip r:embed="rId2" cstate="print">
             <a:extLst>
               <a:ext uri="{28A0092B-C50C-407E-A947-70E740481C1C}">
                 <a14:useLocalDpi xmlns:a14="http://schemas.microsoft.com/office/drawing/2010/main" val="0"/>
               </a:ext>
             </a:extLst>
           </a:blip>
-          <a:srcRect l="32386" t="44317" r="47500" b="38455"/>
+          <a:srcRect/>
           <a:stretch/>
         </p:blipFill>
         <p:spPr bwMode="auto">
@@ -8192,14 +9215,14 @@
           <p:nvPr/>
         </p:nvPicPr>
         <p:blipFill rotWithShape="1">
-          <a:blip r:embed="rId3">
+          <a:blip r:embed="rId3" cstate="print">
             <a:extLst>
               <a:ext uri="{28A0092B-C50C-407E-A947-70E740481C1C}">
                 <a14:useLocalDpi xmlns:a14="http://schemas.microsoft.com/office/drawing/2010/main" val="0"/>
               </a:ext>
             </a:extLst>
           </a:blip>
-          <a:srcRect l="31761" t="63636" r="51705" b="27415"/>
+          <a:srcRect/>
           <a:stretch/>
         </p:blipFill>
         <p:spPr bwMode="auto">
@@ -9658,7 +10681,7 @@
           <p:nvPr/>
         </p:nvPicPr>
         <p:blipFill rotWithShape="1">
-          <a:blip r:embed="rId2">
+          <a:blip r:embed="rId3" cstate="print">
             <a:extLst>
               <a:ext uri="{28A0092B-C50C-407E-A947-70E740481C1C}">
                 <a14:useLocalDpi xmlns:a14="http://schemas.microsoft.com/office/drawing/2010/main" val="0"/>
@@ -9735,11 +10758,11 @@
           <p:nvPr/>
         </p:nvPicPr>
         <p:blipFill rotWithShape="1">
-          <a:blip r:embed="rId3">
+          <a:blip r:embed="rId4" cstate="print">
             <a:extLst>
               <a:ext uri="{BEBA8EAE-BF5A-486C-A8C5-ECC9F3942E4B}">
                 <a14:imgProps xmlns:a14="http://schemas.microsoft.com/office/drawing/2010/main">
-                  <a14:imgLayer r:embed="rId4">
+                  <a14:imgLayer r:embed="rId5">
                     <a14:imgEffect>
                       <a14:brightnessContrast contrast="-40000"/>
                     </a14:imgEffect>
@@ -9751,7 +10774,7 @@
               </a:ext>
             </a:extLst>
           </a:blip>
-          <a:srcRect l="1875" r="2557"/>
+          <a:srcRect/>
           <a:stretch/>
         </p:blipFill>
         <p:spPr bwMode="auto">
@@ -9980,7 +11003,7 @@
           <p:nvPr/>
         </p:nvPicPr>
         <p:blipFill rotWithShape="1">
-          <a:blip r:embed="rId5">
+          <a:blip r:embed="rId6" cstate="print">
             <a:lum bright="-20000" contrast="40000"/>
             <a:extLst>
               <a:ext uri="{28A0092B-C50C-407E-A947-70E740481C1C}">
@@ -10580,7 +11603,7 @@
           <p:nvPr/>
         </p:nvPicPr>
         <p:blipFill rotWithShape="1">
-          <a:blip r:embed="rId2">
+          <a:blip r:embed="rId3" cstate="print">
             <a:extLst>
               <a:ext uri="{28A0092B-C50C-407E-A947-70E740481C1C}">
                 <a14:useLocalDpi xmlns:a14="http://schemas.microsoft.com/office/drawing/2010/main" val="0"/>
@@ -11279,14 +12302,14 @@
           <p:nvPr/>
         </p:nvPicPr>
         <p:blipFill rotWithShape="1">
-          <a:blip r:embed="rId2">
+          <a:blip r:embed="rId3" cstate="print">
             <a:extLst>
               <a:ext uri="{28A0092B-C50C-407E-A947-70E740481C1C}">
                 <a14:useLocalDpi xmlns:a14="http://schemas.microsoft.com/office/drawing/2010/main" val="0"/>
               </a:ext>
             </a:extLst>
           </a:blip>
-          <a:srcRect l="35649" t="25214" r="29126" b="41717"/>
+          <a:srcRect/>
           <a:stretch/>
         </p:blipFill>
         <p:spPr bwMode="auto">
@@ -11326,7 +12349,7 @@
           <p:nvPr/>
         </p:nvPicPr>
         <p:blipFill>
-          <a:blip r:embed="rId3">
+          <a:blip r:embed="rId4">
             <a:extLst>
               <a:ext uri="{28A0092B-C50C-407E-A947-70E740481C1C}">
                 <a14:useLocalDpi xmlns:a14="http://schemas.microsoft.com/office/drawing/2010/main" val="0"/>

</xml_diff>